<commit_message>
further cleaned up datasets
</commit_message>
<xml_diff>
--- a/Costa RIca Crime Data Visualization Web Application.pptx
+++ b/Costa RIca Crime Data Visualization Web Application.pptx
@@ -4006,7 +4006,7 @@
         </p:spPr>
         <p:txBody>
           <a:bodyPr>
-            <a:normAutofit fontScale="92500" lnSpcReduction="10000"/>
+            <a:normAutofit fontScale="77500" lnSpcReduction="20000"/>
           </a:bodyPr>
           <a:lstStyle/>
           <a:p>
@@ -4121,12 +4121,19 @@
               </a:rPr>
               <a:t> in 2019 </a:t>
             </a:r>
-            <a:endParaRPr lang="en-US" dirty="0">
-              <a:solidFill>
-                <a:srgbClr val="000000"/>
-              </a:solidFill>
-              <a:latin typeface="Helvetica Neue" panose="02000503000000020004" pitchFamily="2" charset="0"/>
-            </a:endParaRPr>
+          </a:p>
+          <a:p>
+            <a:pPr lvl="2"/>
+            <a:r>
+              <a:rPr lang="en-US" dirty="0">
+                <a:solidFill>
+                  <a:srgbClr val="000000"/>
+                </a:solidFill>
+                <a:effectLst/>
+                <a:latin typeface="Helvetica Neue" panose="02000503000000020004" pitchFamily="2" charset="0"/>
+              </a:rPr>
+              <a:t>Rio Cuarto canton was created in 2019</a:t>
+            </a:r>
           </a:p>
           <a:p>
             <a:pPr marL="342900" indent="-342900">
@@ -4267,33 +4274,90 @@
               <a:t>Guacimo</a:t>
             </a:r>
             <a:r>
-              <a:rPr lang="en-US">
-                <a:solidFill>
-                  <a:srgbClr val="101418"/>
-                </a:solidFill>
-                <a:latin typeface="Neue Haas Grotesk Text Pro" panose="020B0504020202020204" pitchFamily="34" charset="77"/>
-              </a:rPr>
-              <a:t> canton </a:t>
-            </a:r>
-            <a:r>
               <a:rPr lang="en-US" dirty="0">
                 <a:solidFill>
                   <a:srgbClr val="101418"/>
                 </a:solidFill>
                 <a:latin typeface="Neue Haas Grotesk Text Pro" panose="020B0504020202020204" pitchFamily="34" charset="77"/>
               </a:rPr>
-              <a:t>was a similar story . The crime data spelled the district as Merecedes, rather than Mercedes which is the official government legal name for the district. </a:t>
-            </a:r>
-            <a:endParaRPr lang="en-US" b="0" i="0" dirty="0">
-              <a:solidFill>
-                <a:srgbClr val="101418"/>
-              </a:solidFill>
-              <a:effectLst/>
-              <a:latin typeface="Neue Haas Grotesk Text Pro" panose="020B0504020202020204" pitchFamily="34" charset="77"/>
-            </a:endParaRPr>
+              <a:t> canton was a similar story . The crime data spelled the district as Merecedes, rather than Mercedes which is the official government legal name for the district. </a:t>
+            </a:r>
+          </a:p>
+          <a:p>
+            <a:pPr marL="342900" indent="-342900">
+              <a:buFont typeface="+mj-lt"/>
+              <a:buAutoNum type="arabicPeriod"/>
+            </a:pPr>
+            <a:r>
+              <a:rPr lang="en-US" b="0" i="0" dirty="0">
+                <a:solidFill>
+                  <a:srgbClr val="101418"/>
+                </a:solidFill>
+                <a:effectLst/>
+                <a:latin typeface="Neue Haas Grotesk Text Pro" panose="020B0504020202020204" pitchFamily="34" charset="77"/>
+              </a:rPr>
+              <a:t>Clear human error</a:t>
+            </a:r>
           </a:p>
           <a:p>
             <a:pPr lvl="2"/>
+            <a:r>
+              <a:rPr lang="en-US" dirty="0" err="1">
+                <a:solidFill>
+                  <a:srgbClr val="000000"/>
+                </a:solidFill>
+                <a:latin typeface="Helvetica Neue" panose="02000503000000020004" pitchFamily="2" charset="0"/>
+              </a:rPr>
+              <a:t>Sierpe</a:t>
+            </a:r>
+            <a:r>
+              <a:rPr lang="en-US" dirty="0">
+                <a:solidFill>
+                  <a:srgbClr val="000000"/>
+                </a:solidFill>
+                <a:latin typeface="Helvetica Neue" panose="02000503000000020004" pitchFamily="2" charset="0"/>
+              </a:rPr>
+              <a:t> district is in the canton of Osa, but was mistakenly labeled to have the canton of Puntarenas in the </a:t>
+            </a:r>
+            <a:r>
+              <a:rPr lang="en-US" dirty="0" err="1">
+                <a:solidFill>
+                  <a:srgbClr val="000000"/>
+                </a:solidFill>
+                <a:latin typeface="Helvetica Neue" panose="02000503000000020004" pitchFamily="2" charset="0"/>
+              </a:rPr>
+              <a:t>GeoJSON</a:t>
+            </a:r>
+            <a:r>
+              <a:rPr lang="en-US" dirty="0">
+                <a:solidFill>
+                  <a:srgbClr val="000000"/>
+                </a:solidFill>
+                <a:latin typeface="Helvetica Neue" panose="02000503000000020004" pitchFamily="2" charset="0"/>
+              </a:rPr>
+              <a:t>.</a:t>
+            </a:r>
+          </a:p>
+          <a:p>
+            <a:pPr lvl="2"/>
+            <a:r>
+              <a:rPr lang="en-US" dirty="0">
+                <a:solidFill>
+                  <a:srgbClr val="000000"/>
+                </a:solidFill>
+                <a:latin typeface="Helvetica Neue" panose="02000503000000020004" pitchFamily="2" charset="0"/>
+              </a:rPr>
+              <a:t>Angeles district of San Rafael is actually named Los Angeles district of San </a:t>
+            </a:r>
+            <a:r>
+              <a:rPr lang="en-US">
+                <a:solidFill>
+                  <a:srgbClr val="000000"/>
+                </a:solidFill>
+                <a:latin typeface="Helvetica Neue" panose="02000503000000020004" pitchFamily="2" charset="0"/>
+              </a:rPr>
+              <a:t>Rafael canton</a:t>
+            </a:r>
             <a:endParaRPr lang="en-US" b="0" i="0" dirty="0">
               <a:solidFill>
                 <a:srgbClr val="101418"/>

</xml_diff>